<commit_message>
Fix typo in user guide
</commit_message>
<xml_diff>
--- a/docs/diagrams/AppImages.pptx
+++ b/docs/diagrams/AppImages.pptx
@@ -196,7 +196,7 @@
           <a:p>
             <a:fld id="{3884EE36-8E2D-3346-96F0-5A9726056045}" type="datetimeFigureOut">
               <a:rPr lang="en-US" smtClean="0"/>
-              <a:t>6/11/16</a:t>
+              <a:t>7/11/16</a:t>
             </a:fld>
             <a:endParaRPr lang="en-US"/>
           </a:p>
@@ -729,7 +729,7 @@
           <a:p>
             <a:fld id="{C35BE8CE-91EF-AA49-A107-10E2E1297D0F}" type="datetimeFigureOut">
               <a:rPr lang="en-US" smtClean="0"/>
-              <a:t>6/11/16</a:t>
+              <a:t>7/11/16</a:t>
             </a:fld>
             <a:endParaRPr lang="en-US"/>
           </a:p>
@@ -899,7 +899,7 @@
           <a:p>
             <a:fld id="{C35BE8CE-91EF-AA49-A107-10E2E1297D0F}" type="datetimeFigureOut">
               <a:rPr lang="en-US" smtClean="0"/>
-              <a:t>6/11/16</a:t>
+              <a:t>7/11/16</a:t>
             </a:fld>
             <a:endParaRPr lang="en-US"/>
           </a:p>
@@ -1079,7 +1079,7 @@
           <a:p>
             <a:fld id="{C35BE8CE-91EF-AA49-A107-10E2E1297D0F}" type="datetimeFigureOut">
               <a:rPr lang="en-US" smtClean="0"/>
-              <a:t>6/11/16</a:t>
+              <a:t>7/11/16</a:t>
             </a:fld>
             <a:endParaRPr lang="en-US"/>
           </a:p>
@@ -1249,7 +1249,7 @@
           <a:p>
             <a:fld id="{C35BE8CE-91EF-AA49-A107-10E2E1297D0F}" type="datetimeFigureOut">
               <a:rPr lang="en-US" smtClean="0"/>
-              <a:t>6/11/16</a:t>
+              <a:t>7/11/16</a:t>
             </a:fld>
             <a:endParaRPr lang="en-US"/>
           </a:p>
@@ -1495,7 +1495,7 @@
           <a:p>
             <a:fld id="{C35BE8CE-91EF-AA49-A107-10E2E1297D0F}" type="datetimeFigureOut">
               <a:rPr lang="en-US" smtClean="0"/>
-              <a:t>6/11/16</a:t>
+              <a:t>7/11/16</a:t>
             </a:fld>
             <a:endParaRPr lang="en-US"/>
           </a:p>
@@ -1783,7 +1783,7 @@
           <a:p>
             <a:fld id="{C35BE8CE-91EF-AA49-A107-10E2E1297D0F}" type="datetimeFigureOut">
               <a:rPr lang="en-US" smtClean="0"/>
-              <a:t>6/11/16</a:t>
+              <a:t>7/11/16</a:t>
             </a:fld>
             <a:endParaRPr lang="en-US"/>
           </a:p>
@@ -2205,7 +2205,7 @@
           <a:p>
             <a:fld id="{C35BE8CE-91EF-AA49-A107-10E2E1297D0F}" type="datetimeFigureOut">
               <a:rPr lang="en-US" smtClean="0"/>
-              <a:t>6/11/16</a:t>
+              <a:t>7/11/16</a:t>
             </a:fld>
             <a:endParaRPr lang="en-US"/>
           </a:p>
@@ -2323,7 +2323,7 @@
           <a:p>
             <a:fld id="{C35BE8CE-91EF-AA49-A107-10E2E1297D0F}" type="datetimeFigureOut">
               <a:rPr lang="en-US" smtClean="0"/>
-              <a:t>6/11/16</a:t>
+              <a:t>7/11/16</a:t>
             </a:fld>
             <a:endParaRPr lang="en-US"/>
           </a:p>
@@ -2418,7 +2418,7 @@
           <a:p>
             <a:fld id="{C35BE8CE-91EF-AA49-A107-10E2E1297D0F}" type="datetimeFigureOut">
               <a:rPr lang="en-US" smtClean="0"/>
-              <a:t>6/11/16</a:t>
+              <a:t>7/11/16</a:t>
             </a:fld>
             <a:endParaRPr lang="en-US"/>
           </a:p>
@@ -2695,7 +2695,7 @@
           <a:p>
             <a:fld id="{C35BE8CE-91EF-AA49-A107-10E2E1297D0F}" type="datetimeFigureOut">
               <a:rPr lang="en-US" smtClean="0"/>
-              <a:t>6/11/16</a:t>
+              <a:t>7/11/16</a:t>
             </a:fld>
             <a:endParaRPr lang="en-US"/>
           </a:p>
@@ -2948,7 +2948,7 @@
           <a:p>
             <a:fld id="{C35BE8CE-91EF-AA49-A107-10E2E1297D0F}" type="datetimeFigureOut">
               <a:rPr lang="en-US" smtClean="0"/>
-              <a:t>6/11/16</a:t>
+              <a:t>7/11/16</a:t>
             </a:fld>
             <a:endParaRPr lang="en-US"/>
           </a:p>
@@ -3161,7 +3161,7 @@
           <a:p>
             <a:fld id="{C35BE8CE-91EF-AA49-A107-10E2E1297D0F}" type="datetimeFigureOut">
               <a:rPr lang="en-US" smtClean="0"/>
-              <a:t>6/11/16</a:t>
+              <a:t>7/11/16</a:t>
             </a:fld>
             <a:endParaRPr lang="en-US"/>
           </a:p>
@@ -3700,14 +3700,7 @@
                     <a:latin typeface="Helvetica"/>
                     <a:cs typeface="Helvetica"/>
                   </a:rPr>
-                  <a:t>. Events </a:t>
-                </a:r>
-                <a:r>
-                  <a:rPr lang="en-US" dirty="0" smtClean="0">
-                    <a:latin typeface="Helvetica"/>
-                    <a:cs typeface="Helvetica"/>
-                  </a:rPr>
-                  <a:t>List</a:t>
+                  <a:t>. Events List</a:t>
                 </a:r>
                 <a:endParaRPr lang="en-US" dirty="0">
                   <a:latin typeface="Helvetica"/>
@@ -3809,14 +3802,7 @@
                     <a:latin typeface="Helvetica"/>
                     <a:cs typeface="Helvetica"/>
                   </a:rPr>
-                  <a:t>. Deadlines </a:t>
-                </a:r>
-                <a:r>
-                  <a:rPr lang="en-US" dirty="0" smtClean="0">
-                    <a:latin typeface="Helvetica"/>
-                    <a:cs typeface="Helvetica"/>
-                  </a:rPr>
-                  <a:t>List</a:t>
+                  <a:t>. Deadlines List</a:t>
                 </a:r>
                 <a:endParaRPr lang="en-US" dirty="0">
                   <a:latin typeface="Helvetica"/>
@@ -3932,14 +3918,7 @@
                     <a:latin typeface="Helvetica"/>
                     <a:cs typeface="Helvetica"/>
                   </a:rPr>
-                  <a:t> </a:t>
-                </a:r>
-                <a:r>
-                  <a:rPr lang="en-US" dirty="0" smtClean="0">
-                    <a:latin typeface="Helvetica"/>
-                    <a:cs typeface="Helvetica"/>
-                  </a:rPr>
-                  <a:t>List</a:t>
+                  <a:t> List</a:t>
                 </a:r>
                 <a:endParaRPr lang="en-US" dirty="0">
                   <a:latin typeface="Helvetica"/>
@@ -14882,14 +14861,21 @@
                   <a:latin typeface="Helvetica"/>
                   <a:cs typeface="Helvetica"/>
                 </a:rPr>
-                <a:t>If you undo and enter a valid undoable command, you can no longer redo. Please </a:t>
+                <a:t>If you undo and enter a valid undoable command, you can no longer redo. </a:t>
               </a:r>
               <a:r>
-                <a:rPr lang="en-US" sz="1400" dirty="0" err="1" smtClean="0">
+                <a:rPr lang="en-US" sz="1400" smtClean="0">
                   <a:latin typeface="Helvetica"/>
                   <a:cs typeface="Helvetica"/>
                 </a:rPr>
-                <a:t>becareful</a:t>
+                <a:t>Please </a:t>
+              </a:r>
+              <a:r>
+                <a:rPr lang="en-US" sz="1400" smtClean="0">
+                  <a:latin typeface="Helvetica"/>
+                  <a:cs typeface="Helvetica"/>
+                </a:rPr>
+                <a:t>be careful</a:t>
               </a:r>
               <a:r>
                 <a:rPr lang="en-US" sz="1400" dirty="0" smtClean="0">

</xml_diff>